<commit_message>
[Update] aws 자격증 img
</commit_message>
<xml_diff>
--- a/Article/Note/아마존_자격증취득/img/img.pptx
+++ b/Article/Note/아마존_자격증취득/img/img.pptx
@@ -3352,10 +3352,10 @@
       </p:grpSpPr>
       <p:pic>
         <p:nvPicPr>
-          <p:cNvPr id="1026" name="Picture 2" descr="AWS Certified Cloud Practitioner">
-            <a:extLst>
-              <a:ext uri="{FF2B5EF4-FFF2-40B4-BE49-F238E27FC236}">
-                <a16:creationId xmlns:a16="http://schemas.microsoft.com/office/drawing/2014/main" id="{5C6C0B05-1B2C-4664-987A-2B322C6E7040}"/>
+          <p:cNvPr id="2" name="Picture 2" descr="AWS Certified Cloud Practitioner Logo">
+            <a:extLst>
+              <a:ext uri="{FF2B5EF4-FFF2-40B4-BE49-F238E27FC236}">
+                <a16:creationId xmlns:a16="http://schemas.microsoft.com/office/drawing/2014/main" id="{F032DCF0-5734-434A-8AA3-F5F220FC7BA2}"/>
               </a:ext>
             </a:extLst>
           </p:cNvPr>
@@ -3379,8 +3379,8 @@
         </p:blipFill>
         <p:spPr bwMode="auto">
           <a:xfrm>
-            <a:off x="4476750" y="1455187"/>
-            <a:ext cx="3238500" cy="3238500"/>
+            <a:off x="3395808" y="397675"/>
+            <a:ext cx="5400384" cy="5400384"/>
           </a:xfrm>
           <a:prstGeom prst="rect">
             <a:avLst/>
@@ -3399,6 +3399,214 @@
       </p:pic>
       <p:sp>
         <p:nvSpPr>
+          <p:cNvPr id="3" name="직사각형 2">
+            <a:extLst>
+              <a:ext uri="{FF2B5EF4-FFF2-40B4-BE49-F238E27FC236}">
+                <a16:creationId xmlns:a16="http://schemas.microsoft.com/office/drawing/2014/main" id="{A827C356-1460-47F6-8BA5-99FDB5050271}"/>
+              </a:ext>
+            </a:extLst>
+          </p:cNvPr>
+          <p:cNvSpPr/>
+          <p:nvPr/>
+        </p:nvSpPr>
+        <p:spPr>
+          <a:xfrm>
+            <a:off x="2667000" y="266700"/>
+            <a:ext cx="6467475" cy="495300"/>
+          </a:xfrm>
+          <a:prstGeom prst="rect">
+            <a:avLst/>
+          </a:prstGeom>
+          <a:solidFill>
+            <a:srgbClr val="F8991C"/>
+          </a:solidFill>
+          <a:ln>
+            <a:noFill/>
+          </a:ln>
+        </p:spPr>
+        <p:style>
+          <a:lnRef idx="2">
+            <a:schemeClr val="accent1">
+              <a:shade val="50000"/>
+            </a:schemeClr>
+          </a:lnRef>
+          <a:fillRef idx="1">
+            <a:schemeClr val="accent1"/>
+          </a:fillRef>
+          <a:effectRef idx="0">
+            <a:schemeClr val="accent1"/>
+          </a:effectRef>
+          <a:fontRef idx="minor">
+            <a:schemeClr val="lt1"/>
+          </a:fontRef>
+        </p:style>
+        <p:txBody>
+          <a:bodyPr rtlCol="0" anchor="ctr"/>
+          <a:lstStyle/>
+          <a:p>
+            <a:pPr algn="ctr"/>
+            <a:endParaRPr lang="ko-KR" altLang="en-US"/>
+          </a:p>
+        </p:txBody>
+      </p:sp>
+      <p:sp>
+        <p:nvSpPr>
+          <p:cNvPr id="6" name="직사각형 5">
+            <a:extLst>
+              <a:ext uri="{FF2B5EF4-FFF2-40B4-BE49-F238E27FC236}">
+                <a16:creationId xmlns:a16="http://schemas.microsoft.com/office/drawing/2014/main" id="{24186052-EAC9-4A7B-A203-EBE105E4C38F}"/>
+              </a:ext>
+            </a:extLst>
+          </p:cNvPr>
+          <p:cNvSpPr/>
+          <p:nvPr/>
+        </p:nvSpPr>
+        <p:spPr>
+          <a:xfrm>
+            <a:off x="3228975" y="5778233"/>
+            <a:ext cx="6467475" cy="495300"/>
+          </a:xfrm>
+          <a:prstGeom prst="rect">
+            <a:avLst/>
+          </a:prstGeom>
+          <a:solidFill>
+            <a:srgbClr val="F8991C"/>
+          </a:solidFill>
+          <a:ln>
+            <a:noFill/>
+          </a:ln>
+        </p:spPr>
+        <p:style>
+          <a:lnRef idx="2">
+            <a:schemeClr val="accent1">
+              <a:shade val="50000"/>
+            </a:schemeClr>
+          </a:lnRef>
+          <a:fillRef idx="1">
+            <a:schemeClr val="accent1"/>
+          </a:fillRef>
+          <a:effectRef idx="0">
+            <a:schemeClr val="accent1"/>
+          </a:effectRef>
+          <a:fontRef idx="minor">
+            <a:schemeClr val="lt1"/>
+          </a:fontRef>
+        </p:style>
+        <p:txBody>
+          <a:bodyPr rtlCol="0" anchor="ctr"/>
+          <a:lstStyle/>
+          <a:p>
+            <a:pPr algn="ctr"/>
+            <a:endParaRPr lang="ko-KR" altLang="en-US"/>
+          </a:p>
+        </p:txBody>
+      </p:sp>
+      <p:sp>
+        <p:nvSpPr>
+          <p:cNvPr id="7" name="직사각형 6">
+            <a:extLst>
+              <a:ext uri="{FF2B5EF4-FFF2-40B4-BE49-F238E27FC236}">
+                <a16:creationId xmlns:a16="http://schemas.microsoft.com/office/drawing/2014/main" id="{7C633CD5-A444-43C2-A99A-7B7760220FDC}"/>
+              </a:ext>
+            </a:extLst>
+          </p:cNvPr>
+          <p:cNvSpPr/>
+          <p:nvPr/>
+        </p:nvSpPr>
+        <p:spPr>
+          <a:xfrm>
+            <a:off x="2625789" y="692950"/>
+            <a:ext cx="1381126" cy="5719750"/>
+          </a:xfrm>
+          <a:prstGeom prst="rect">
+            <a:avLst/>
+          </a:prstGeom>
+          <a:solidFill>
+            <a:srgbClr val="F8991C"/>
+          </a:solidFill>
+          <a:ln>
+            <a:noFill/>
+          </a:ln>
+        </p:spPr>
+        <p:style>
+          <a:lnRef idx="2">
+            <a:schemeClr val="accent1">
+              <a:shade val="50000"/>
+            </a:schemeClr>
+          </a:lnRef>
+          <a:fillRef idx="1">
+            <a:schemeClr val="accent1"/>
+          </a:fillRef>
+          <a:effectRef idx="0">
+            <a:schemeClr val="accent1"/>
+          </a:effectRef>
+          <a:fontRef idx="minor">
+            <a:schemeClr val="lt1"/>
+          </a:fontRef>
+        </p:style>
+        <p:txBody>
+          <a:bodyPr rtlCol="0" anchor="ctr"/>
+          <a:lstStyle/>
+          <a:p>
+            <a:pPr algn="ctr"/>
+            <a:endParaRPr lang="ko-KR" altLang="en-US"/>
+          </a:p>
+        </p:txBody>
+      </p:sp>
+      <p:sp>
+        <p:nvSpPr>
+          <p:cNvPr id="9" name="직사각형 8">
+            <a:extLst>
+              <a:ext uri="{FF2B5EF4-FFF2-40B4-BE49-F238E27FC236}">
+                <a16:creationId xmlns:a16="http://schemas.microsoft.com/office/drawing/2014/main" id="{E86B8673-9BD5-4F0B-9E21-D2E9A8B9A9FC}"/>
+              </a:ext>
+            </a:extLst>
+          </p:cNvPr>
+          <p:cNvSpPr/>
+          <p:nvPr/>
+        </p:nvSpPr>
+        <p:spPr>
+          <a:xfrm>
+            <a:off x="8185085" y="514350"/>
+            <a:ext cx="1381126" cy="5719750"/>
+          </a:xfrm>
+          <a:prstGeom prst="rect">
+            <a:avLst/>
+          </a:prstGeom>
+          <a:solidFill>
+            <a:srgbClr val="F8991C"/>
+          </a:solidFill>
+          <a:ln>
+            <a:noFill/>
+          </a:ln>
+        </p:spPr>
+        <p:style>
+          <a:lnRef idx="2">
+            <a:schemeClr val="accent1">
+              <a:shade val="50000"/>
+            </a:schemeClr>
+          </a:lnRef>
+          <a:fillRef idx="1">
+            <a:schemeClr val="accent1"/>
+          </a:fillRef>
+          <a:effectRef idx="0">
+            <a:schemeClr val="accent1"/>
+          </a:effectRef>
+          <a:fontRef idx="minor">
+            <a:schemeClr val="lt1"/>
+          </a:fontRef>
+        </p:style>
+        <p:txBody>
+          <a:bodyPr rtlCol="0" anchor="ctr"/>
+          <a:lstStyle/>
+          <a:p>
+            <a:pPr algn="ctr"/>
+            <a:endParaRPr lang="ko-KR" altLang="en-US"/>
+          </a:p>
+        </p:txBody>
+      </p:sp>
+      <p:sp>
+        <p:nvSpPr>
           <p:cNvPr id="8" name="TextBox 7">
             <a:extLst>
               <a:ext uri="{FF2B5EF4-FFF2-40B4-BE49-F238E27FC236}">
@@ -3411,8 +3619,8 @@
         </p:nvSpPr>
         <p:spPr>
           <a:xfrm>
-            <a:off x="4388498" y="4805655"/>
-            <a:ext cx="3415004" cy="646331"/>
+            <a:off x="3954382" y="5188955"/>
+            <a:ext cx="4270310" cy="769441"/>
           </a:xfrm>
           <a:prstGeom prst="rect">
             <a:avLst/>
@@ -3427,7 +3635,7 @@
           <a:p>
             <a:pPr algn="ctr"/>
             <a:r>
-              <a:rPr lang="ko-KR" altLang="en-US" sz="3600" b="1">
+              <a:rPr lang="ko-KR" altLang="en-US" sz="4400" b="1">
                 <a:solidFill>
                   <a:schemeClr val="bg1"/>
                 </a:solidFill>
@@ -3469,6 +3677,41 @@
           <a:chExt cx="0" cy="0"/>
         </a:xfrm>
       </p:grpSpPr>
+      <p:pic>
+        <p:nvPicPr>
+          <p:cNvPr id="3" name="그림 2">
+            <a:extLst>
+              <a:ext uri="{FF2B5EF4-FFF2-40B4-BE49-F238E27FC236}">
+                <a16:creationId xmlns:a16="http://schemas.microsoft.com/office/drawing/2014/main" id="{98863378-A511-439C-B265-A8916BB30639}"/>
+              </a:ext>
+            </a:extLst>
+          </p:cNvPr>
+          <p:cNvPicPr>
+            <a:picLocks noChangeAspect="1"/>
+          </p:cNvPicPr>
+          <p:nvPr/>
+        </p:nvPicPr>
+        <p:blipFill rotWithShape="1">
+          <a:blip r:embed="rId2">
+            <a:extLst>
+              <a:ext uri="{28A0092B-C50C-407E-A947-70E740481C1C}">
+                <a14:useLocalDpi xmlns:a14="http://schemas.microsoft.com/office/drawing/2010/main" val="0"/>
+              </a:ext>
+            </a:extLst>
+          </a:blip>
+          <a:srcRect l="1" r="1045" b="6395"/>
+          <a:stretch/>
+        </p:blipFill>
+        <p:spPr>
+          <a:xfrm>
+            <a:off x="0" y="0"/>
+            <a:ext cx="12064482" cy="6419461"/>
+          </a:xfrm>
+          <a:prstGeom prst="rect">
+            <a:avLst/>
+          </a:prstGeom>
+        </p:spPr>
+      </p:pic>
     </p:spTree>
     <p:extLst>
       <p:ext uri="{BB962C8B-B14F-4D97-AF65-F5344CB8AC3E}">
@@ -3499,6 +3742,41 @@
           <a:chExt cx="0" cy="0"/>
         </a:xfrm>
       </p:grpSpPr>
+      <p:pic>
+        <p:nvPicPr>
+          <p:cNvPr id="3" name="그림 2" descr="텍스트이(가) 표시된 사진&#10;&#10;자동 생성된 설명">
+            <a:extLst>
+              <a:ext uri="{FF2B5EF4-FFF2-40B4-BE49-F238E27FC236}">
+                <a16:creationId xmlns:a16="http://schemas.microsoft.com/office/drawing/2014/main" id="{C21E1C71-1DA3-4B62-8E44-14FB98AE8D4F}"/>
+              </a:ext>
+            </a:extLst>
+          </p:cNvPr>
+          <p:cNvPicPr>
+            <a:picLocks noChangeAspect="1"/>
+          </p:cNvPicPr>
+          <p:nvPr/>
+        </p:nvPicPr>
+        <p:blipFill rotWithShape="1">
+          <a:blip r:embed="rId2">
+            <a:extLst>
+              <a:ext uri="{28A0092B-C50C-407E-A947-70E740481C1C}">
+                <a14:useLocalDpi xmlns:a14="http://schemas.microsoft.com/office/drawing/2010/main" val="0"/>
+              </a:ext>
+            </a:extLst>
+          </a:blip>
+          <a:srcRect r="1199"/>
+          <a:stretch/>
+        </p:blipFill>
+        <p:spPr>
+          <a:xfrm>
+            <a:off x="0" y="0"/>
+            <a:ext cx="12045820" cy="6858000"/>
+          </a:xfrm>
+          <a:prstGeom prst="rect">
+            <a:avLst/>
+          </a:prstGeom>
+        </p:spPr>
+      </p:pic>
     </p:spTree>
     <p:extLst>
       <p:ext uri="{BB962C8B-B14F-4D97-AF65-F5344CB8AC3E}">

</xml_diff>